<commit_message>
Fixed error in presentation slide
</commit_message>
<xml_diff>
--- a/project-1-powerpoint.pptx
+++ b/project-1-powerpoint.pptx
@@ -4178,14 +4178,14 @@
       </p:sp>
       <p:sp>
         <p:nvSpPr>
-          <p:cNvPr id="138" name="Highest increase in male employment : Egypt, Arab Rep. : 4.26%"/>
+          <p:cNvPr id="138" name="Highest increase in female employment : Egypt, Arab Rep. : 4.26%"/>
           <p:cNvSpPr txBox="1"/>
           <p:nvPr/>
         </p:nvSpPr>
         <p:spPr>
           <a:xfrm>
-            <a:off x="1329309" y="1454757"/>
-            <a:ext cx="7869683" cy="411733"/>
+            <a:off x="1214120" y="1454757"/>
+            <a:ext cx="8100061" cy="411733"/>
           </a:xfrm>
           <a:prstGeom prst="rect">
             <a:avLst/>
@@ -4209,7 +4209,7 @@
               <a:defRPr sz="2000"/>
             </a:pPr>
             <a:r>
-              <a:t>Highest increase in male employment : Egypt, Arab Rep. : </a:t>
+              <a:t>Highest increase in female employment : Egypt, Arab Rep. : </a:t>
             </a:r>
             <a:r>
               <a:rPr>

</xml_diff>